<commit_message>
creación archivo seguimiento clases folder resources
</commit_message>
<xml_diff>
--- a/Slides/3_Estructuras condicionales.pptx
+++ b/Slides/3_Estructuras condicionales.pptx
@@ -418,10 +418,25 @@
   <pc:docChgLst>
     <pc:chgData name="Cesar Augusto Lopez Gallego" userId="0dfa9112-9251-4882-b472-cf2dfcee09d1" providerId="ADAL" clId="{2C455F85-5D82-492E-9CD8-10137D83A03A}"/>
     <pc:docChg chg="undo redo custSel addSld delSld modSld">
-      <pc:chgData name="Cesar Augusto Lopez Gallego" userId="0dfa9112-9251-4882-b472-cf2dfcee09d1" providerId="ADAL" clId="{2C455F85-5D82-492E-9CD8-10137D83A03A}" dt="2024-07-30T14:29:03.859" v="1661"/>
+      <pc:chgData name="Cesar Augusto Lopez Gallego" userId="0dfa9112-9251-4882-b472-cf2dfcee09d1" providerId="ADAL" clId="{2C455F85-5D82-492E-9CD8-10137D83A03A}" dt="2024-07-31T14:14:11.354" v="1670" actId="13926"/>
       <pc:docMkLst>
         <pc:docMk/>
       </pc:docMkLst>
+      <pc:sldChg chg="modSp mod">
+        <pc:chgData name="Cesar Augusto Lopez Gallego" userId="0dfa9112-9251-4882-b472-cf2dfcee09d1" providerId="ADAL" clId="{2C455F85-5D82-492E-9CD8-10137D83A03A}" dt="2024-07-31T14:14:11.354" v="1670" actId="13926"/>
+        <pc:sldMkLst>
+          <pc:docMk/>
+          <pc:sldMk cId="3264384231" sldId="274"/>
+        </pc:sldMkLst>
+        <pc:spChg chg="mod">
+          <ac:chgData name="Cesar Augusto Lopez Gallego" userId="0dfa9112-9251-4882-b472-cf2dfcee09d1" providerId="ADAL" clId="{2C455F85-5D82-492E-9CD8-10137D83A03A}" dt="2024-07-31T14:14:11.354" v="1670" actId="13926"/>
+          <ac:spMkLst>
+            <pc:docMk/>
+            <pc:sldMk cId="3264384231" sldId="274"/>
+            <ac:spMk id="3" creationId="{00000000-0000-0000-0000-000000000000}"/>
+          </ac:spMkLst>
+        </pc:spChg>
+      </pc:sldChg>
       <pc:sldChg chg="modSp mod">
         <pc:chgData name="Cesar Augusto Lopez Gallego" userId="0dfa9112-9251-4882-b472-cf2dfcee09d1" providerId="ADAL" clId="{2C455F85-5D82-492E-9CD8-10137D83A03A}" dt="2024-07-30T14:21:05.367" v="1157" actId="1076"/>
         <pc:sldMkLst>
@@ -17220,7 +17235,7 @@
         </p:nvSpPr>
         <p:spPr>
           <a:xfrm>
-            <a:off x="681644" y="1733234"/>
+            <a:off x="1057424" y="1916114"/>
             <a:ext cx="11321935" cy="3323987"/>
           </a:xfrm>
           <a:prstGeom prst="rect">
@@ -17240,15 +17255,27 @@
               </a:lnSpc>
             </a:pPr>
             <a:r>
-              <a:rPr lang="es-ES" sz="2000" dirty="0"/>
+              <a:rPr lang="es-ES" sz="2000" dirty="0">
+                <a:highlight>
+                  <a:srgbClr val="FFFF00"/>
+                </a:highlight>
+              </a:rPr>
               <a:t>En un país se otorgará a las ciudades que tengan más de 100.000 habitantes y un área superior a 20.000Kms</a:t>
             </a:r>
             <a:r>
-              <a:rPr lang="es-ES" sz="2000" baseline="30000" dirty="0"/>
+              <a:rPr lang="es-ES" sz="2000" baseline="30000" dirty="0">
+                <a:highlight>
+                  <a:srgbClr val="FFFF00"/>
+                </a:highlight>
+              </a:rPr>
               <a:t>2</a:t>
             </a:r>
             <a:r>
-              <a:rPr lang="es-ES" sz="2000" dirty="0"/>
+              <a:rPr lang="es-ES" sz="2000" dirty="0">
+                <a:highlight>
+                  <a:srgbClr val="FFFF00"/>
+                </a:highlight>
+              </a:rPr>
               <a:t>, una partida para emergencias de 500.000.000. </a:t>
             </a:r>
           </a:p>
@@ -17259,15 +17286,27 @@
               </a:lnSpc>
             </a:pPr>
             <a:r>
-              <a:rPr lang="es-ES" sz="2000" dirty="0"/>
+              <a:rPr lang="es-ES" sz="2000" dirty="0">
+                <a:highlight>
+                  <a:srgbClr val="FFFF00"/>
+                </a:highlight>
+              </a:rPr>
               <a:t>Si tiene más de 100.000 habitantes pero un área menor o igual a 20.000Kms</a:t>
             </a:r>
             <a:r>
-              <a:rPr lang="es-ES" sz="2000" baseline="30000" dirty="0"/>
+              <a:rPr lang="es-ES" sz="2000" baseline="30000" dirty="0">
+                <a:highlight>
+                  <a:srgbClr val="FFFF00"/>
+                </a:highlight>
+              </a:rPr>
               <a:t>2</a:t>
             </a:r>
             <a:r>
-              <a:rPr lang="es-ES" sz="2000" dirty="0"/>
+              <a:rPr lang="es-ES" sz="2000" dirty="0">
+                <a:highlight>
+                  <a:srgbClr val="FFFF00"/>
+                </a:highlight>
+              </a:rPr>
               <a:t>, la partida será de 450.000.000</a:t>
             </a:r>
           </a:p>
@@ -17278,15 +17317,27 @@
               </a:lnSpc>
             </a:pPr>
             <a:r>
-              <a:rPr lang="es-ES" sz="2000" dirty="0"/>
+              <a:rPr lang="es-ES" sz="2000" dirty="0">
+                <a:highlight>
+                  <a:srgbClr val="FFFF00"/>
+                </a:highlight>
+              </a:rPr>
               <a:t>Si tiene entre 80.000 y 100.000 habitante y el área es mayor a 20.000  </a:t>
             </a:r>
             <a:r>
-              <a:rPr lang="es-ES" sz="2000" dirty="0" err="1"/>
+              <a:rPr lang="es-ES" sz="2000" dirty="0" err="1">
+                <a:highlight>
+                  <a:srgbClr val="FFFF00"/>
+                </a:highlight>
+              </a:rPr>
               <a:t>Kms</a:t>
             </a:r>
             <a:r>
-              <a:rPr lang="es-ES" sz="2000" dirty="0"/>
+              <a:rPr lang="es-ES" sz="2000" dirty="0">
+                <a:highlight>
+                  <a:srgbClr val="FFFF00"/>
+                </a:highlight>
+              </a:rPr>
               <a:t>, la partida será de 600.000.000</a:t>
             </a:r>
           </a:p>

</xml_diff>